<commit_message>
chore: update dataset link
</commit_message>
<xml_diff>
--- a/report.pptx
+++ b/report.pptx
@@ -504,7 +504,7 @@
           <a:p>
             <a:fld id="{846CE7D5-CF57-46EF-B807-FDD0502418D4}" type="datetimeFigureOut">
               <a:rPr lang="en-US" smtClean="0"/>
-              <a:t>4/22/2025</a:t>
+              <a:t>4/23/2025</a:t>
             </a:fld>
             <a:endParaRPr lang="en-US"/>
           </a:p>
@@ -674,7 +674,7 @@
           <a:p>
             <a:fld id="{846CE7D5-CF57-46EF-B807-FDD0502418D4}" type="datetimeFigureOut">
               <a:rPr lang="en-US" smtClean="0"/>
-              <a:t>4/22/2025</a:t>
+              <a:t>4/23/2025</a:t>
             </a:fld>
             <a:endParaRPr lang="en-US"/>
           </a:p>
@@ -854,7 +854,7 @@
           <a:p>
             <a:fld id="{846CE7D5-CF57-46EF-B807-FDD0502418D4}" type="datetimeFigureOut">
               <a:rPr lang="en-US" smtClean="0"/>
-              <a:t>4/22/2025</a:t>
+              <a:t>4/23/2025</a:t>
             </a:fld>
             <a:endParaRPr lang="en-US"/>
           </a:p>
@@ -1024,7 +1024,7 @@
           <a:p>
             <a:fld id="{846CE7D5-CF57-46EF-B807-FDD0502418D4}" type="datetimeFigureOut">
               <a:rPr lang="en-US" smtClean="0"/>
-              <a:t>4/22/2025</a:t>
+              <a:t>4/23/2025</a:t>
             </a:fld>
             <a:endParaRPr lang="en-US"/>
           </a:p>
@@ -1270,7 +1270,7 @@
           <a:p>
             <a:fld id="{846CE7D5-CF57-46EF-B807-FDD0502418D4}" type="datetimeFigureOut">
               <a:rPr lang="en-US" smtClean="0"/>
-              <a:t>4/22/2025</a:t>
+              <a:t>4/23/2025</a:t>
             </a:fld>
             <a:endParaRPr lang="en-US"/>
           </a:p>
@@ -1502,7 +1502,7 @@
           <a:p>
             <a:fld id="{846CE7D5-CF57-46EF-B807-FDD0502418D4}" type="datetimeFigureOut">
               <a:rPr lang="en-US" smtClean="0"/>
-              <a:t>4/22/2025</a:t>
+              <a:t>4/23/2025</a:t>
             </a:fld>
             <a:endParaRPr lang="en-US"/>
           </a:p>
@@ -1869,7 +1869,7 @@
           <a:p>
             <a:fld id="{846CE7D5-CF57-46EF-B807-FDD0502418D4}" type="datetimeFigureOut">
               <a:rPr lang="en-US" smtClean="0"/>
-              <a:t>4/22/2025</a:t>
+              <a:t>4/23/2025</a:t>
             </a:fld>
             <a:endParaRPr lang="en-US"/>
           </a:p>
@@ -1987,7 +1987,7 @@
           <a:p>
             <a:fld id="{846CE7D5-CF57-46EF-B807-FDD0502418D4}" type="datetimeFigureOut">
               <a:rPr lang="en-US" smtClean="0"/>
-              <a:t>4/22/2025</a:t>
+              <a:t>4/23/2025</a:t>
             </a:fld>
             <a:endParaRPr lang="en-US"/>
           </a:p>
@@ -2082,7 +2082,7 @@
           <a:p>
             <a:fld id="{846CE7D5-CF57-46EF-B807-FDD0502418D4}" type="datetimeFigureOut">
               <a:rPr lang="en-US" smtClean="0"/>
-              <a:t>4/22/2025</a:t>
+              <a:t>4/23/2025</a:t>
             </a:fld>
             <a:endParaRPr lang="en-US"/>
           </a:p>
@@ -2359,7 +2359,7 @@
           <a:p>
             <a:fld id="{846CE7D5-CF57-46EF-B807-FDD0502418D4}" type="datetimeFigureOut">
               <a:rPr lang="en-US" smtClean="0"/>
-              <a:t>4/22/2025</a:t>
+              <a:t>4/23/2025</a:t>
             </a:fld>
             <a:endParaRPr lang="en-US"/>
           </a:p>
@@ -2616,7 +2616,7 @@
           <a:p>
             <a:fld id="{846CE7D5-CF57-46EF-B807-FDD0502418D4}" type="datetimeFigureOut">
               <a:rPr lang="en-US" smtClean="0"/>
-              <a:t>4/22/2025</a:t>
+              <a:t>4/23/2025</a:t>
             </a:fld>
             <a:endParaRPr lang="en-US"/>
           </a:p>
@@ -2829,7 +2829,7 @@
           <a:p>
             <a:fld id="{846CE7D5-CF57-46EF-B807-FDD0502418D4}" type="datetimeFigureOut">
               <a:rPr lang="en-US" smtClean="0"/>
-              <a:t>4/22/2025</a:t>
+              <a:t>4/23/2025</a:t>
             </a:fld>
             <a:endParaRPr lang="en-US"/>
           </a:p>
@@ -3502,17 +3502,29 @@
             <p:ph idx="1"/>
           </p:nvPr>
         </p:nvSpPr>
-        <p:spPr/>
+        <p:spPr>
+          <a:xfrm>
+            <a:off x="838200" y="1377779"/>
+            <a:ext cx="10515600" cy="2341606"/>
+          </a:xfrm>
+        </p:spPr>
         <p:txBody>
           <a:bodyPr vert="horz" lIns="91440" tIns="45720" rIns="91440" bIns="45720" rtlCol="0" anchor="t">
-            <a:normAutofit/>
+            <a:normAutofit fontScale="70000" lnSpcReduction="20000"/>
           </a:bodyPr>
           <a:lstStyle/>
           <a:p>
             <a:r>
               <a:rPr lang="en-US" dirty="0"/>
-              <a:t>Link to the dataset and its explanation</a:t>
-            </a:r>
+              <a:t>Dataset link: </a:t>
+            </a:r>
+            <a:r>
+              <a:rPr lang="en-US" dirty="0">
+                <a:hlinkClick r:id="rId2"/>
+              </a:rPr>
+              <a:t>https://ieee-dataport.org/documents/smart-campus-dataset</a:t>
+            </a:r>
+            <a:endParaRPr lang="en-US" dirty="0"/>
           </a:p>
           <a:p>
             <a:pPr lvl="1">
@@ -3520,9 +3532,85 @@
               <a:buChar char="o"/>
             </a:pPr>
             <a:r>
+              <a:rPr lang="en-US" dirty="0" err="1"/>
+              <a:t>Tme</a:t>
+            </a:r>
+            <a:r>
               <a:rPr lang="en-US" dirty="0"/>
-              <a:t>Meaning</a:t>
-            </a:r>
+              <a:t>-series of measurements of IoT devices within a Smart Campus located in Finland</a:t>
+            </a:r>
+          </a:p>
+          <a:p>
+            <a:pPr lvl="2">
+              <a:buFont typeface="Courier New" panose="020B0604020202020204" pitchFamily="34" charset="0"/>
+              <a:buChar char="o"/>
+            </a:pPr>
+            <a:r>
+              <a:rPr lang="en-US" dirty="0"/>
+              <a:t>429 distinct devices</a:t>
+            </a:r>
+          </a:p>
+          <a:p>
+            <a:pPr lvl="2">
+              <a:buFont typeface="Courier New" panose="020B0604020202020204" pitchFamily="34" charset="0"/>
+              <a:buChar char="o"/>
+            </a:pPr>
+            <a:r>
+              <a:rPr lang="it-IT" dirty="0"/>
+              <a:t>~ 90M </a:t>
+            </a:r>
+            <a:r>
+              <a:rPr lang="it-IT" dirty="0" err="1"/>
+              <a:t>measurements</a:t>
+            </a:r>
+            <a:r>
+              <a:rPr lang="en-US" dirty="0"/>
+              <a:t> from </a:t>
+            </a:r>
+            <a:r>
+              <a:rPr lang="it-IT" sz="2400" dirty="0"/>
+              <a:t>2020-08-01 to 2021-02-23</a:t>
+            </a:r>
+          </a:p>
+          <a:p>
+            <a:pPr lvl="2">
+              <a:buFont typeface="Courier New" panose="020B0604020202020204" pitchFamily="34" charset="0"/>
+              <a:buChar char="o"/>
+            </a:pPr>
+            <a:r>
+              <a:rPr lang="it-IT" sz="2400" dirty="0"/>
+              <a:t>one </a:t>
+            </a:r>
+            <a:r>
+              <a:rPr lang="it-IT" sz="2400" dirty="0" err="1"/>
+              <a:t>row</a:t>
+            </a:r>
+            <a:r>
+              <a:rPr lang="it-IT" sz="2400" dirty="0"/>
+              <a:t> for </a:t>
+            </a:r>
+            <a:r>
+              <a:rPr lang="it-IT" sz="2400" dirty="0" err="1"/>
+              <a:t>each</a:t>
+            </a:r>
+            <a:r>
+              <a:rPr lang="it-IT" sz="2400" dirty="0"/>
+              <a:t> device </a:t>
+            </a:r>
+            <a:r>
+              <a:rPr lang="it-IT" sz="2400" dirty="0" err="1"/>
+              <a:t>measurement</a:t>
+            </a:r>
+            <a:r>
+              <a:rPr lang="it-IT" sz="2400" dirty="0"/>
+              <a:t>.</a:t>
+            </a:r>
+          </a:p>
+          <a:p>
+            <a:pPr marL="914400" lvl="2" indent="0">
+              <a:buNone/>
+            </a:pPr>
+            <a:endParaRPr lang="it-IT" sz="2400" dirty="0"/>
           </a:p>
           <a:p>
             <a:pPr lvl="1">
@@ -3530,22 +3618,114 @@
               <a:buChar char="o"/>
             </a:pPr>
             <a:r>
-              <a:rPr lang="en-US" dirty="0"/>
-              <a:t>Type of data</a:t>
-            </a:r>
-          </a:p>
-          <a:p>
-            <a:pPr lvl="1">
+              <a:rPr lang="it-IT" sz="2800" dirty="0"/>
+              <a:t> 15 </a:t>
+            </a:r>
+            <a:r>
+              <a:rPr lang="it-IT" sz="2800" dirty="0" err="1"/>
+              <a:t>attributes</a:t>
+            </a:r>
+            <a:endParaRPr lang="it-IT" sz="2800" dirty="0"/>
+          </a:p>
+          <a:p>
+            <a:pPr lvl="2">
               <a:buFont typeface="Courier New" panose="020B0604020202020204" pitchFamily="34" charset="0"/>
               <a:buChar char="o"/>
             </a:pPr>
             <a:r>
-              <a:rPr lang="en-US" dirty="0"/>
-              <a:t>….</a:t>
-            </a:r>
-          </a:p>
-        </p:txBody>
-      </p:sp>
+              <a:rPr lang="it-IT" sz="2400" dirty="0"/>
+              <a:t>4 </a:t>
+            </a:r>
+            <a:r>
+              <a:rPr lang="it-IT" sz="2400" dirty="0" err="1"/>
+              <a:t>categorical</a:t>
+            </a:r>
+            <a:r>
+              <a:rPr lang="it-IT" sz="2400" dirty="0"/>
+              <a:t> </a:t>
+            </a:r>
+            <a:r>
+              <a:rPr lang="it-IT" sz="2400" dirty="0" err="1"/>
+              <a:t>attributes</a:t>
+            </a:r>
+            <a:endParaRPr lang="it-IT" sz="2400" dirty="0"/>
+          </a:p>
+          <a:p>
+            <a:pPr lvl="2">
+              <a:buFont typeface="Courier New" panose="020B0604020202020204" pitchFamily="34" charset="0"/>
+              <a:buChar char="o"/>
+            </a:pPr>
+            <a:r>
+              <a:rPr lang="it-IT" sz="2400" dirty="0"/>
+              <a:t>11 </a:t>
+            </a:r>
+            <a:r>
+              <a:rPr lang="it-IT" sz="2400" dirty="0" err="1"/>
+              <a:t>numerical</a:t>
+            </a:r>
+            <a:r>
+              <a:rPr lang="it-IT" sz="2400" dirty="0"/>
+              <a:t> </a:t>
+            </a:r>
+            <a:r>
+              <a:rPr lang="it-IT" sz="2400" dirty="0" err="1"/>
+              <a:t>attributes</a:t>
+            </a:r>
+            <a:endParaRPr lang="it-IT" sz="2400" dirty="0"/>
+          </a:p>
+          <a:p>
+            <a:pPr lvl="2">
+              <a:buFont typeface="Courier New" panose="020B0604020202020204" pitchFamily="34" charset="0"/>
+              <a:buChar char="o"/>
+            </a:pPr>
+            <a:endParaRPr lang="it-IT" sz="2400" dirty="0"/>
+          </a:p>
+          <a:p>
+            <a:pPr lvl="2">
+              <a:buFont typeface="Courier New" panose="020B0604020202020204" pitchFamily="34" charset="0"/>
+              <a:buChar char="o"/>
+            </a:pPr>
+            <a:endParaRPr lang="it-IT" sz="2400" dirty="0"/>
+          </a:p>
+          <a:p>
+            <a:pPr lvl="2">
+              <a:buFont typeface="Courier New" panose="020B0604020202020204" pitchFamily="34" charset="0"/>
+              <a:buChar char="o"/>
+            </a:pPr>
+            <a:endParaRPr lang="it-IT" sz="2400" dirty="0"/>
+          </a:p>
+        </p:txBody>
+      </p:sp>
+      <p:pic>
+        <p:nvPicPr>
+          <p:cNvPr id="12" name="Immagine 11">
+            <a:extLst>
+              <a:ext uri="{FF2B5EF4-FFF2-40B4-BE49-F238E27FC236}">
+                <a16:creationId xmlns:a16="http://schemas.microsoft.com/office/drawing/2014/main" id="{B4BB1AD9-DC7F-432B-A2CD-07DF01A20B3B}"/>
+              </a:ext>
+            </a:extLst>
+          </p:cNvPr>
+          <p:cNvPicPr>
+            <a:picLocks noChangeAspect="1"/>
+          </p:cNvPicPr>
+          <p:nvPr/>
+        </p:nvPicPr>
+        <p:blipFill>
+          <a:blip r:embed="rId3"/>
+          <a:stretch>
+            <a:fillRect/>
+          </a:stretch>
+        </p:blipFill>
+        <p:spPr>
+          <a:xfrm>
+            <a:off x="432486" y="3914389"/>
+            <a:ext cx="11327027" cy="1470153"/>
+          </a:xfrm>
+          <a:prstGeom prst="rect">
+            <a:avLst/>
+          </a:prstGeom>
+        </p:spPr>
+      </p:pic>
     </p:spTree>
     <p:extLst>
       <p:ext uri="{BB962C8B-B14F-4D97-AF65-F5344CB8AC3E}">
@@ -4628,15 +4808,6 @@
 </file>
 
 <file path=customXml/item1.xml><?xml version="1.0" encoding="utf-8"?>
-<?mso-contentType ?>
-<FormTemplates xmlns="http://schemas.microsoft.com/sharepoint/v3/contenttype/forms">
-  <Display>DocumentLibraryForm</Display>
-  <Edit>DocumentLibraryForm</Edit>
-  <New>DocumentLibraryForm</New>
-</FormTemplates>
-</file>
-
-<file path=customXml/item2.xml><?xml version="1.0" encoding="utf-8"?>
 <ct:contentTypeSchema xmlns:ct="http://schemas.microsoft.com/office/2006/metadata/contentType" xmlns:ma="http://schemas.microsoft.com/office/2006/metadata/properties/metaAttributes" ct:_="" ma:_="" ma:contentTypeName="Document" ma:contentTypeID="0x010100BC5649DEEF7EAA4281B660BC4D70188E" ma:contentTypeVersion="0" ma:contentTypeDescription="Create a new document." ma:contentTypeScope="" ma:versionID="301ef04a56364911fad0d1fd77d869e6">
   <xsd:schema xmlns:xsd="http://www.w3.org/2001/XMLSchema" xmlns:xs="http://www.w3.org/2001/XMLSchema" xmlns:p="http://schemas.microsoft.com/office/2006/metadata/properties" targetNamespace="http://schemas.microsoft.com/office/2006/metadata/properties" ma:root="true" ma:fieldsID="31d5eec3c12ee2e8127422d567928fa7">
     <xsd:element name="properties">
@@ -4750,6 +4921,15 @@
 </ct:contentTypeSchema>
 </file>
 
+<file path=customXml/item2.xml><?xml version="1.0" encoding="utf-8"?>
+<?mso-contentType ?>
+<FormTemplates xmlns="http://schemas.microsoft.com/sharepoint/v3/contenttype/forms">
+  <Display>DocumentLibraryForm</Display>
+  <Edit>DocumentLibraryForm</Edit>
+  <New>DocumentLibraryForm</New>
+</FormTemplates>
+</file>
+
 <file path=customXml/item3.xml><?xml version="1.0" encoding="utf-8"?>
 <p:properties xmlns:p="http://schemas.microsoft.com/office/2006/metadata/properties" xmlns:xsi="http://www.w3.org/2001/XMLSchema-instance" xmlns:pc="http://schemas.microsoft.com/office/infopath/2007/PartnerControls">
   <documentManagement/>
@@ -4757,14 +4937,6 @@
 </file>
 
 <file path=customXml/itemProps1.xml><?xml version="1.0" encoding="utf-8"?>
-<ds:datastoreItem xmlns:ds="http://schemas.openxmlformats.org/officeDocument/2006/customXml" ds:itemID="{E8FA02BE-F298-4C0E-826B-3DCF0C1A4C36}">
-  <ds:schemaRefs>
-    <ds:schemaRef ds:uri="http://schemas.microsoft.com/sharepoint/v3/contenttype/forms"/>
-  </ds:schemaRefs>
-</ds:datastoreItem>
-</file>
-
-<file path=customXml/itemProps2.xml><?xml version="1.0" encoding="utf-8"?>
 <ds:datastoreItem xmlns:ds="http://schemas.openxmlformats.org/officeDocument/2006/customXml" ds:itemID="{4E5EBCCC-8EA9-4E69-9092-A8F8FF32D4D4}">
   <ds:schemaRefs>
     <ds:schemaRef ds:uri="http://schemas.microsoft.com/office/2006/metadata/contentType"/>
@@ -4780,6 +4952,14 @@
 </ds:datastoreItem>
 </file>
 
+<file path=customXml/itemProps2.xml><?xml version="1.0" encoding="utf-8"?>
+<ds:datastoreItem xmlns:ds="http://schemas.openxmlformats.org/officeDocument/2006/customXml" ds:itemID="{E8FA02BE-F298-4C0E-826B-3DCF0C1A4C36}">
+  <ds:schemaRefs>
+    <ds:schemaRef ds:uri="http://schemas.microsoft.com/sharepoint/v3/contenttype/forms"/>
+  </ds:schemaRefs>
+</ds:datastoreItem>
+</file>
+
 <file path=customXml/itemProps3.xml><?xml version="1.0" encoding="utf-8"?>
 <ds:datastoreItem xmlns:ds="http://schemas.openxmlformats.org/officeDocument/2006/customXml" ds:itemID="{DDDB10EB-FE29-4608-8A39-F7D9D5476B60}">
   <ds:schemaRefs>

</xml_diff>